<commit_message>
Updated presentation and web application files
</commit_message>
<xml_diff>
--- a/presentation/presentationUpdated.pptx
+++ b/presentation/presentationUpdated.pptx
@@ -27,26 +27,27 @@
     <p:embeddedFont>
       <p:font typeface="Aptos SemiBold" panose="020B0004020202020204" pitchFamily="34" charset="0"/>
       <p:bold r:id="rId15"/>
+      <p:boldItalic r:id="rId16"/>
     </p:embeddedFont>
     <p:embeddedFont>
       <p:font typeface="Brick Sans" panose="020B0604020202020204" charset="0"/>
-      <p:regular r:id="rId16"/>
+      <p:regular r:id="rId17"/>
     </p:embeddedFont>
     <p:embeddedFont>
       <p:font typeface="Canva Sans" panose="020B0604020202020204" charset="0"/>
-      <p:regular r:id="rId17"/>
+      <p:regular r:id="rId18"/>
     </p:embeddedFont>
     <p:embeddedFont>
       <p:font typeface="Public Sans" panose="020B0604020202020204" charset="0"/>
-      <p:regular r:id="rId18"/>
+      <p:regular r:id="rId19"/>
     </p:embeddedFont>
     <p:embeddedFont>
       <p:font typeface="Public Sans Bold" panose="020B0604020202020204" charset="0"/>
-      <p:regular r:id="rId19"/>
+      <p:regular r:id="rId20"/>
     </p:embeddedFont>
     <p:embeddedFont>
       <p:font typeface="Public Sans Heavy" panose="020B0604020202020204" charset="0"/>
-      <p:regular r:id="rId20"/>
+      <p:regular r:id="rId21"/>
     </p:embeddedFont>
   </p:embeddedFontLst>
   <p:defaultTextStyle>
@@ -6234,12 +6235,213 @@
           </a:p>
         </p:txBody>
       </p:sp>
+      <p:sp>
+        <p:nvSpPr>
+          <p:cNvPr id="2" name="TextBox 1">
+            <a:extLst>
+              <a:ext uri="{FF2B5EF4-FFF2-40B4-BE49-F238E27FC236}">
+                <a16:creationId xmlns:a16="http://schemas.microsoft.com/office/drawing/2014/main" id="{54B5C03A-E20C-212C-F6B9-B44059BB7FFF}"/>
+              </a:ext>
+            </a:extLst>
+          </p:cNvPr>
+          <p:cNvSpPr txBox="1"/>
+          <p:nvPr/>
+        </p:nvSpPr>
+        <p:spPr>
+          <a:xfrm>
+            <a:off x="381000" y="3290047"/>
+            <a:ext cx="4876800" cy="2677656"/>
+          </a:xfrm>
+          <a:prstGeom prst="rect">
+            <a:avLst/>
+          </a:prstGeom>
+        </p:spPr>
+        <p:style>
+          <a:lnRef idx="1">
+            <a:schemeClr val="accent1"/>
+          </a:lnRef>
+          <a:fillRef idx="2">
+            <a:schemeClr val="accent1"/>
+          </a:fillRef>
+          <a:effectRef idx="1">
+            <a:schemeClr val="accent1"/>
+          </a:effectRef>
+          <a:fontRef idx="minor">
+            <a:schemeClr val="dk1"/>
+          </a:fontRef>
+        </p:style>
+        <p:txBody>
+          <a:bodyPr wrap="square" rtlCol="0">
+            <a:spAutoFit/>
+          </a:bodyPr>
+          <a:lstStyle/>
+          <a:p>
+            <a:pPr algn="ctr"/>
+            <a:r>
+              <a:rPr lang="en-GB" sz="2400" b="0" i="0" dirty="0" err="1">
+                <a:solidFill>
+                  <a:srgbClr val="0070C0"/>
+                </a:solidFill>
+                <a:effectLst/>
+                <a:latin typeface="Aptos SemiBold" panose="020F0502020204030204" pitchFamily="34" charset="0"/>
+              </a:rPr>
+              <a:t>DiabPredict</a:t>
+            </a:r>
+            <a:r>
+              <a:rPr lang="en-GB" sz="2400" b="0" i="0" dirty="0">
+                <a:solidFill>
+                  <a:srgbClr val="0070C0"/>
+                </a:solidFill>
+                <a:effectLst/>
+                <a:latin typeface="Aptos SemiBold" panose="020F0502020204030204" pitchFamily="34" charset="0"/>
+              </a:rPr>
+              <a:t>+ </a:t>
+            </a:r>
+          </a:p>
+          <a:p>
+            <a:pPr marL="285750" indent="-285750" algn="just">
+              <a:buFont typeface="Wingdings" panose="05000000000000000000" pitchFamily="2" charset="2"/>
+              <a:buChar char="§"/>
+            </a:pPr>
+            <a:r>
+              <a:rPr lang="en-GB" b="0" i="0" dirty="0">
+                <a:solidFill>
+                  <a:srgbClr val="0D0D0D"/>
+                </a:solidFill>
+                <a:effectLst/>
+                <a:latin typeface="Aptos SemiBold" panose="020F0502020204030204" pitchFamily="34" charset="0"/>
+              </a:rPr>
+              <a:t>Web app predicts diabetes risk using machine learning. </a:t>
+            </a:r>
+          </a:p>
+          <a:p>
+            <a:pPr marL="285750" indent="-285750" algn="just">
+              <a:buFont typeface="Wingdings" panose="05000000000000000000" pitchFamily="2" charset="2"/>
+              <a:buChar char="§"/>
+            </a:pPr>
+            <a:r>
+              <a:rPr lang="en-GB" b="0" i="0" dirty="0">
+                <a:solidFill>
+                  <a:srgbClr val="0D0D0D"/>
+                </a:solidFill>
+                <a:effectLst/>
+                <a:latin typeface="Aptos SemiBold" panose="020F0502020204030204" pitchFamily="34" charset="0"/>
+              </a:rPr>
+              <a:t>With input on age, gender, lifestyle, and medical history, it instantly assesses diabetes status and probability. </a:t>
+            </a:r>
+          </a:p>
+          <a:p>
+            <a:pPr marL="285750" indent="-285750" algn="just">
+              <a:buFont typeface="Wingdings" panose="05000000000000000000" pitchFamily="2" charset="2"/>
+              <a:buChar char="§"/>
+            </a:pPr>
+            <a:r>
+              <a:rPr lang="en-GB" b="0" i="0" dirty="0">
+                <a:solidFill>
+                  <a:srgbClr val="0D0D0D"/>
+                </a:solidFill>
+                <a:effectLst/>
+                <a:latin typeface="Aptos SemiBold" panose="020F0502020204030204" pitchFamily="34" charset="0"/>
+              </a:rPr>
+              <a:t>Built on Flask and </a:t>
+            </a:r>
+            <a:r>
+              <a:rPr lang="en-GB" b="0" i="0" dirty="0" err="1">
+                <a:solidFill>
+                  <a:srgbClr val="0D0D0D"/>
+                </a:solidFill>
+                <a:effectLst/>
+                <a:latin typeface="Aptos SemiBold" panose="020F0502020204030204" pitchFamily="34" charset="0"/>
+              </a:rPr>
+              <a:t>Keras</a:t>
+            </a:r>
+            <a:r>
+              <a:rPr lang="en-GB" b="0" i="0" dirty="0">
+                <a:solidFill>
+                  <a:srgbClr val="0D0D0D"/>
+                </a:solidFill>
+                <a:effectLst/>
+                <a:latin typeface="Aptos SemiBold" panose="020F0502020204030204" pitchFamily="34" charset="0"/>
+              </a:rPr>
+              <a:t>, it offers accurate predictions and promotes health awareness.“</a:t>
+            </a:r>
+            <a:endParaRPr lang="en-US" dirty="0">
+              <a:latin typeface="Aptos SemiBold" panose="020F0502020204030204" pitchFamily="34" charset="0"/>
+            </a:endParaRPr>
+          </a:p>
+        </p:txBody>
+      </p:sp>
+      <p:sp>
+        <p:nvSpPr>
+          <p:cNvPr id="4" name="Freeform 16">
+            <a:extLst>
+              <a:ext uri="{FF2B5EF4-FFF2-40B4-BE49-F238E27FC236}">
+                <a16:creationId xmlns:a16="http://schemas.microsoft.com/office/drawing/2014/main" id="{B84200C3-3E38-0FA4-9267-4DFA15EE31C7}"/>
+              </a:ext>
+            </a:extLst>
+          </p:cNvPr>
+          <p:cNvSpPr/>
+          <p:nvPr/>
+        </p:nvSpPr>
+        <p:spPr>
+          <a:xfrm rot="905778">
+            <a:off x="14904023" y="3465264"/>
+            <a:ext cx="1460273" cy="2294715"/>
+          </a:xfrm>
+          <a:custGeom>
+            <a:avLst/>
+            <a:gdLst/>
+            <a:ahLst/>
+            <a:cxnLst/>
+            <a:rect l="l" t="t" r="r" b="b"/>
+            <a:pathLst>
+              <a:path w="1460273" h="2294715">
+                <a:moveTo>
+                  <a:pt x="0" y="0"/>
+                </a:moveTo>
+                <a:lnTo>
+                  <a:pt x="1460273" y="0"/>
+                </a:lnTo>
+                <a:lnTo>
+                  <a:pt x="1460273" y="2294715"/>
+                </a:lnTo>
+                <a:lnTo>
+                  <a:pt x="0" y="2294715"/>
+                </a:lnTo>
+                <a:lnTo>
+                  <a:pt x="0" y="0"/>
+                </a:lnTo>
+                <a:close/>
+              </a:path>
+            </a:pathLst>
+          </a:custGeom>
+          <a:blipFill>
+            <a:blip r:embed="rId5">
+              <a:extLst>
+                <a:ext uri="{96DAC541-7B7A-43D3-8B79-37D633B846F1}">
+                  <asvg:svgBlip xmlns:asvg="http://schemas.microsoft.com/office/drawing/2016/SVG/main" r:embed="rId6"/>
+                </a:ext>
+              </a:extLst>
+            </a:blip>
+            <a:stretch>
+              <a:fillRect/>
+            </a:stretch>
+          </a:blipFill>
+        </p:spPr>
+        <p:txBody>
+          <a:bodyPr/>
+          <a:lstStyle/>
+          <a:p>
+            <a:endParaRPr lang="en-US"/>
+          </a:p>
+        </p:txBody>
+      </p:sp>
       <p:pic>
         <p:nvPicPr>
-          <p:cNvPr id="3" name="Picture 2">
+          <p:cNvPr id="6" name="Picture 5">
             <a:extLst>
               <a:ext uri="{FF2B5EF4-FFF2-40B4-BE49-F238E27FC236}">
-                <a16:creationId xmlns:a16="http://schemas.microsoft.com/office/drawing/2014/main" id="{51D6412C-C561-60F6-E167-5699F9A2CA9C}"/>
+                <a16:creationId xmlns:a16="http://schemas.microsoft.com/office/drawing/2014/main" id="{77BBF90E-89F3-6948-AE3E-34E96D9DE52D}"/>
               </a:ext>
             </a:extLst>
           </p:cNvPr>
@@ -6249,15 +6451,15 @@
           <p:nvPr/>
         </p:nvPicPr>
         <p:blipFill>
-          <a:blip r:embed="rId5"/>
+          <a:blip r:embed="rId7"/>
           <a:stretch>
             <a:fillRect/>
           </a:stretch>
         </p:blipFill>
         <p:spPr>
           <a:xfrm>
-            <a:off x="5715000" y="1219200"/>
-            <a:ext cx="7162800" cy="8877300"/>
+            <a:off x="6096000" y="1333500"/>
+            <a:ext cx="7414451" cy="8686800"/>
           </a:xfrm>
           <a:prstGeom prst="round2DiagRect">
             <a:avLst>
@@ -6280,207 +6482,6 @@
           </a:effectLst>
         </p:spPr>
       </p:pic>
-      <p:sp>
-        <p:nvSpPr>
-          <p:cNvPr id="2" name="TextBox 1">
-            <a:extLst>
-              <a:ext uri="{FF2B5EF4-FFF2-40B4-BE49-F238E27FC236}">
-                <a16:creationId xmlns:a16="http://schemas.microsoft.com/office/drawing/2014/main" id="{54B5C03A-E20C-212C-F6B9-B44059BB7FFF}"/>
-              </a:ext>
-            </a:extLst>
-          </p:cNvPr>
-          <p:cNvSpPr txBox="1"/>
-          <p:nvPr/>
-        </p:nvSpPr>
-        <p:spPr>
-          <a:xfrm>
-            <a:off x="381000" y="3290047"/>
-            <a:ext cx="4876800" cy="2677656"/>
-          </a:xfrm>
-          <a:prstGeom prst="rect">
-            <a:avLst/>
-          </a:prstGeom>
-        </p:spPr>
-        <p:style>
-          <a:lnRef idx="1">
-            <a:schemeClr val="accent1"/>
-          </a:lnRef>
-          <a:fillRef idx="2">
-            <a:schemeClr val="accent1"/>
-          </a:fillRef>
-          <a:effectRef idx="1">
-            <a:schemeClr val="accent1"/>
-          </a:effectRef>
-          <a:fontRef idx="minor">
-            <a:schemeClr val="dk1"/>
-          </a:fontRef>
-        </p:style>
-        <p:txBody>
-          <a:bodyPr wrap="square" rtlCol="0">
-            <a:spAutoFit/>
-          </a:bodyPr>
-          <a:lstStyle/>
-          <a:p>
-            <a:pPr algn="ctr"/>
-            <a:r>
-              <a:rPr lang="en-GB" sz="2400" b="0" i="0" dirty="0" err="1">
-                <a:solidFill>
-                  <a:srgbClr val="0070C0"/>
-                </a:solidFill>
-                <a:effectLst/>
-                <a:latin typeface="Aptos SemiBold" panose="020F0502020204030204" pitchFamily="34" charset="0"/>
-              </a:rPr>
-              <a:t>DiabPredict</a:t>
-            </a:r>
-            <a:r>
-              <a:rPr lang="en-GB" sz="2400" b="0" i="0" dirty="0">
-                <a:solidFill>
-                  <a:srgbClr val="0070C0"/>
-                </a:solidFill>
-                <a:effectLst/>
-                <a:latin typeface="Aptos SemiBold" panose="020F0502020204030204" pitchFamily="34" charset="0"/>
-              </a:rPr>
-              <a:t>+ </a:t>
-            </a:r>
-          </a:p>
-          <a:p>
-            <a:pPr marL="285750" indent="-285750" algn="just">
-              <a:buFont typeface="Wingdings" panose="05000000000000000000" pitchFamily="2" charset="2"/>
-              <a:buChar char="§"/>
-            </a:pPr>
-            <a:r>
-              <a:rPr lang="en-GB" b="0" i="0" dirty="0">
-                <a:solidFill>
-                  <a:srgbClr val="0D0D0D"/>
-                </a:solidFill>
-                <a:effectLst/>
-                <a:latin typeface="Aptos SemiBold" panose="020F0502020204030204" pitchFamily="34" charset="0"/>
-              </a:rPr>
-              <a:t>Web app predicts diabetes risk using machine learning. </a:t>
-            </a:r>
-          </a:p>
-          <a:p>
-            <a:pPr marL="285750" indent="-285750" algn="just">
-              <a:buFont typeface="Wingdings" panose="05000000000000000000" pitchFamily="2" charset="2"/>
-              <a:buChar char="§"/>
-            </a:pPr>
-            <a:r>
-              <a:rPr lang="en-GB" b="0" i="0" dirty="0">
-                <a:solidFill>
-                  <a:srgbClr val="0D0D0D"/>
-                </a:solidFill>
-                <a:effectLst/>
-                <a:latin typeface="Aptos SemiBold" panose="020F0502020204030204" pitchFamily="34" charset="0"/>
-              </a:rPr>
-              <a:t>With input on age, gender, lifestyle, and medical history, it instantly assesses diabetes status and probability. </a:t>
-            </a:r>
-          </a:p>
-          <a:p>
-            <a:pPr marL="285750" indent="-285750" algn="just">
-              <a:buFont typeface="Wingdings" panose="05000000000000000000" pitchFamily="2" charset="2"/>
-              <a:buChar char="§"/>
-            </a:pPr>
-            <a:r>
-              <a:rPr lang="en-GB" b="0" i="0" dirty="0">
-                <a:solidFill>
-                  <a:srgbClr val="0D0D0D"/>
-                </a:solidFill>
-                <a:effectLst/>
-                <a:latin typeface="Aptos SemiBold" panose="020F0502020204030204" pitchFamily="34" charset="0"/>
-              </a:rPr>
-              <a:t>Built on Flask and </a:t>
-            </a:r>
-            <a:r>
-              <a:rPr lang="en-GB" b="0" i="0" dirty="0" err="1">
-                <a:solidFill>
-                  <a:srgbClr val="0D0D0D"/>
-                </a:solidFill>
-                <a:effectLst/>
-                <a:latin typeface="Aptos SemiBold" panose="020F0502020204030204" pitchFamily="34" charset="0"/>
-              </a:rPr>
-              <a:t>Keras</a:t>
-            </a:r>
-            <a:r>
-              <a:rPr lang="en-GB" b="0" i="0" dirty="0">
-                <a:solidFill>
-                  <a:srgbClr val="0D0D0D"/>
-                </a:solidFill>
-                <a:effectLst/>
-                <a:latin typeface="Aptos SemiBold" panose="020F0502020204030204" pitchFamily="34" charset="0"/>
-              </a:rPr>
-              <a:t>, it offers accurate predictions and promotes health awareness.“</a:t>
-            </a:r>
-            <a:endParaRPr lang="en-US" dirty="0">
-              <a:latin typeface="Aptos SemiBold" panose="020F0502020204030204" pitchFamily="34" charset="0"/>
-            </a:endParaRPr>
-          </a:p>
-        </p:txBody>
-      </p:sp>
-      <p:sp>
-        <p:nvSpPr>
-          <p:cNvPr id="4" name="Freeform 16">
-            <a:extLst>
-              <a:ext uri="{FF2B5EF4-FFF2-40B4-BE49-F238E27FC236}">
-                <a16:creationId xmlns:a16="http://schemas.microsoft.com/office/drawing/2014/main" id="{B84200C3-3E38-0FA4-9267-4DFA15EE31C7}"/>
-              </a:ext>
-            </a:extLst>
-          </p:cNvPr>
-          <p:cNvSpPr/>
-          <p:nvPr/>
-        </p:nvSpPr>
-        <p:spPr>
-          <a:xfrm rot="905778">
-            <a:off x="14904023" y="3465264"/>
-            <a:ext cx="1460273" cy="2294715"/>
-          </a:xfrm>
-          <a:custGeom>
-            <a:avLst/>
-            <a:gdLst/>
-            <a:ahLst/>
-            <a:cxnLst/>
-            <a:rect l="l" t="t" r="r" b="b"/>
-            <a:pathLst>
-              <a:path w="1460273" h="2294715">
-                <a:moveTo>
-                  <a:pt x="0" y="0"/>
-                </a:moveTo>
-                <a:lnTo>
-                  <a:pt x="1460273" y="0"/>
-                </a:lnTo>
-                <a:lnTo>
-                  <a:pt x="1460273" y="2294715"/>
-                </a:lnTo>
-                <a:lnTo>
-                  <a:pt x="0" y="2294715"/>
-                </a:lnTo>
-                <a:lnTo>
-                  <a:pt x="0" y="0"/>
-                </a:lnTo>
-                <a:close/>
-              </a:path>
-            </a:pathLst>
-          </a:custGeom>
-          <a:blipFill>
-            <a:blip r:embed="rId6">
-              <a:extLst>
-                <a:ext uri="{96DAC541-7B7A-43D3-8B79-37D633B846F1}">
-                  <asvg:svgBlip xmlns:asvg="http://schemas.microsoft.com/office/drawing/2016/SVG/main" r:embed="rId7"/>
-                </a:ext>
-              </a:extLst>
-            </a:blip>
-            <a:stretch>
-              <a:fillRect/>
-            </a:stretch>
-          </a:blipFill>
-        </p:spPr>
-        <p:txBody>
-          <a:bodyPr/>
-          <a:lstStyle/>
-          <a:p>
-            <a:endParaRPr lang="en-US"/>
-          </a:p>
-        </p:txBody>
-      </p:sp>
     </p:spTree>
     <p:extLst>
       <p:ext uri="{BB962C8B-B14F-4D97-AF65-F5344CB8AC3E}">

</xml_diff>